<commit_message>
Atualização Sprint 4 COMPLETA
</commit_message>
<xml_diff>
--- a/Sprint-4/Artefatos_Sprint4.pptx
+++ b/Sprint-4/Artefatos_Sprint4.pptx
@@ -8,10 +8,13 @@
   <p:sldIdLst>
     <p:sldId id="256" r:id="rId3"/>
     <p:sldId id="257" r:id="rId4"/>
-    <p:sldId id="258" r:id="rId5"/>
-    <p:sldId id="259" r:id="rId6"/>
-    <p:sldId id="260" r:id="rId7"/>
-    <p:sldId id="261" r:id="rId8"/>
+    <p:sldId id="262" r:id="rId5"/>
+    <p:sldId id="263" r:id="rId6"/>
+    <p:sldId id="264" r:id="rId7"/>
+    <p:sldId id="258" r:id="rId8"/>
+    <p:sldId id="259" r:id="rId9"/>
+    <p:sldId id="260" r:id="rId10"/>
+    <p:sldId id="261" r:id="rId11"/>
   </p:sldIdLst>
   <p:sldSz cx="9144000" cy="5143500" type="screen16x9"/>
   <p:notesSz cx="6858000" cy="9144000"/>
@@ -4852,8 +4855,8 @@
         </p:blipFill>
         <p:spPr>
           <a:xfrm>
-            <a:off x="733769" y="1684961"/>
-            <a:ext cx="7630224" cy="2774022"/>
+            <a:off x="733769" y="1734376"/>
+            <a:ext cx="7630224" cy="2675191"/>
           </a:xfrm>
           <a:prstGeom prst="rect">
             <a:avLst/>
@@ -4917,7 +4920,7 @@
       </p:grpSpPr>
       <p:sp>
         <p:nvSpPr>
-          <p:cNvPr id="81" name="TextShape 1"/>
+          <p:cNvPr id="79" name="TextShape 1"/>
           <p:cNvSpPr txBox="1"/>
           <p:nvPr/>
         </p:nvSpPr>
@@ -4944,7 +4947,7 @@
               </a:lnSpc>
             </a:pPr>
             <a:r>
-              <a:rPr lang="pt-BR" sz="3600" b="1" strike="noStrike" spc="-1">
+              <a:rPr lang="pt-BR" sz="3600" b="1" strike="noStrike" spc="-1" dirty="0">
                 <a:solidFill>
                   <a:srgbClr val="FFFFFF"/>
                 </a:solidFill>
@@ -4957,9 +4960,69 @@
                 <a:ea typeface="Arial"/>
               </a:rPr>
               <a:t>
-Artefato #2: Sprint Backlog</a:t>
+Artefato </a:t>
             </a:r>
-            <a:endParaRPr lang="pt-BR" sz="1400" b="0" strike="noStrike" spc="-1">
+            <a:r>
+              <a:rPr lang="pt-BR" sz="3600" b="1" strike="noStrike" spc="-1" dirty="0" smtClean="0">
+                <a:solidFill>
+                  <a:srgbClr val="FFFFFF"/>
+                </a:solidFill>
+                <a:uFill>
+                  <a:solidFill>
+                    <a:srgbClr val="FFFFFF"/>
+                  </a:solidFill>
+                </a:uFill>
+                <a:latin typeface="Arial"/>
+                <a:ea typeface="Arial"/>
+              </a:rPr>
+              <a:t>#1: </a:t>
+            </a:r>
+            <a:r>
+              <a:rPr lang="pt-BR" sz="3600" b="1" strike="noStrike" spc="-1" dirty="0" err="1">
+                <a:solidFill>
+                  <a:srgbClr val="FFFFFF"/>
+                </a:solidFill>
+                <a:uFill>
+                  <a:solidFill>
+                    <a:srgbClr val="FFFFFF"/>
+                  </a:solidFill>
+                </a:uFill>
+                <a:latin typeface="Arial"/>
+                <a:ea typeface="Arial"/>
+              </a:rPr>
+              <a:t>Product</a:t>
+            </a:r>
+            <a:r>
+              <a:rPr lang="pt-BR" sz="3600" b="1" strike="noStrike" spc="-1" dirty="0">
+                <a:solidFill>
+                  <a:srgbClr val="FFFFFF"/>
+                </a:solidFill>
+                <a:uFill>
+                  <a:solidFill>
+                    <a:srgbClr val="FFFFFF"/>
+                  </a:solidFill>
+                </a:uFill>
+                <a:latin typeface="Arial"/>
+                <a:ea typeface="Arial"/>
+              </a:rPr>
+              <a:t> </a:t>
+            </a:r>
+            <a:r>
+              <a:rPr lang="pt-BR" sz="3600" b="1" strike="noStrike" spc="-1" dirty="0" err="1">
+                <a:solidFill>
+                  <a:srgbClr val="FFFFFF"/>
+                </a:solidFill>
+                <a:uFill>
+                  <a:solidFill>
+                    <a:srgbClr val="FFFFFF"/>
+                  </a:solidFill>
+                </a:uFill>
+                <a:latin typeface="Arial"/>
+                <a:ea typeface="Arial"/>
+              </a:rPr>
+              <a:t>Backlog</a:t>
+            </a:r>
+            <a:endParaRPr lang="pt-BR" sz="1400" b="0" strike="noStrike" spc="-1" dirty="0">
               <a:solidFill>
                 <a:srgbClr val="000000"/>
               </a:solidFill>
@@ -4975,7 +5038,7 @@
       </p:sp>
       <p:pic>
         <p:nvPicPr>
-          <p:cNvPr id="82" name="Shape 47"/>
+          <p:cNvPr id="80" name="Shape 41"/>
           <p:cNvPicPr/>
           <p:nvPr/>
         </p:nvPicPr>
@@ -4993,8 +5056,8 @@
         </p:blipFill>
         <p:spPr>
           <a:xfrm>
-            <a:off x="540000" y="1404000"/>
-            <a:ext cx="8028000" cy="3456000"/>
+            <a:off x="1148914" y="1734376"/>
+            <a:ext cx="6799934" cy="2675191"/>
           </a:xfrm>
           <a:prstGeom prst="rect">
             <a:avLst/>
@@ -5005,6 +5068,11 @@
         </p:spPr>
       </p:pic>
     </p:spTree>
+    <p:extLst>
+      <p:ext uri="{BB962C8B-B14F-4D97-AF65-F5344CB8AC3E}">
+        <p14:creationId xmlns:p14="http://schemas.microsoft.com/office/powerpoint/2010/main" val="1081741211"/>
+      </p:ext>
+    </p:extLst>
   </p:cSld>
   <p:clrMapOvr>
     <a:masterClrMapping/>
@@ -5058,7 +5126,7 @@
       </p:grpSpPr>
       <p:sp>
         <p:nvSpPr>
-          <p:cNvPr id="83" name="TextShape 1"/>
+          <p:cNvPr id="79" name="TextShape 1"/>
           <p:cNvSpPr txBox="1"/>
           <p:nvPr/>
         </p:nvSpPr>
@@ -5085,7 +5153,7 @@
               </a:lnSpc>
             </a:pPr>
             <a:r>
-              <a:rPr lang="pt-BR" sz="3600" b="1" strike="noStrike" spc="-1">
+              <a:rPr lang="pt-BR" sz="3600" b="1" strike="noStrike" spc="-1" dirty="0">
                 <a:solidFill>
                   <a:srgbClr val="FFFFFF"/>
                 </a:solidFill>
@@ -5097,9 +5165,70 @@
                 <a:latin typeface="Arial"/>
                 <a:ea typeface="Arial"/>
               </a:rPr>
-              <a:t>Artefato #3: Gráfico Burndown</a:t>
+              <a:t>
+Artefato </a:t>
             </a:r>
-            <a:endParaRPr lang="pt-BR" sz="1400" b="0" strike="noStrike" spc="-1">
+            <a:r>
+              <a:rPr lang="pt-BR" sz="3600" b="1" strike="noStrike" spc="-1" dirty="0" smtClean="0">
+                <a:solidFill>
+                  <a:srgbClr val="FFFFFF"/>
+                </a:solidFill>
+                <a:uFill>
+                  <a:solidFill>
+                    <a:srgbClr val="FFFFFF"/>
+                  </a:solidFill>
+                </a:uFill>
+                <a:latin typeface="Arial"/>
+                <a:ea typeface="Arial"/>
+              </a:rPr>
+              <a:t>#1: </a:t>
+            </a:r>
+            <a:r>
+              <a:rPr lang="pt-BR" sz="3600" b="1" strike="noStrike" spc="-1" dirty="0" err="1">
+                <a:solidFill>
+                  <a:srgbClr val="FFFFFF"/>
+                </a:solidFill>
+                <a:uFill>
+                  <a:solidFill>
+                    <a:srgbClr val="FFFFFF"/>
+                  </a:solidFill>
+                </a:uFill>
+                <a:latin typeface="Arial"/>
+                <a:ea typeface="Arial"/>
+              </a:rPr>
+              <a:t>Product</a:t>
+            </a:r>
+            <a:r>
+              <a:rPr lang="pt-BR" sz="3600" b="1" strike="noStrike" spc="-1" dirty="0">
+                <a:solidFill>
+                  <a:srgbClr val="FFFFFF"/>
+                </a:solidFill>
+                <a:uFill>
+                  <a:solidFill>
+                    <a:srgbClr val="FFFFFF"/>
+                  </a:solidFill>
+                </a:uFill>
+                <a:latin typeface="Arial"/>
+                <a:ea typeface="Arial"/>
+              </a:rPr>
+              <a:t> </a:t>
+            </a:r>
+            <a:r>
+              <a:rPr lang="pt-BR" sz="3600" b="1" strike="noStrike" spc="-1" dirty="0" err="1">
+                <a:solidFill>
+                  <a:srgbClr val="FFFFFF"/>
+                </a:solidFill>
+                <a:uFill>
+                  <a:solidFill>
+                    <a:srgbClr val="FFFFFF"/>
+                  </a:solidFill>
+                </a:uFill>
+                <a:latin typeface="Arial"/>
+                <a:ea typeface="Arial"/>
+              </a:rPr>
+              <a:t>Backlog</a:t>
+            </a:r>
+            <a:endParaRPr lang="pt-BR" sz="1400" b="0" strike="noStrike" spc="-1" dirty="0">
               <a:solidFill>
                 <a:srgbClr val="000000"/>
               </a:solidFill>
@@ -5115,7 +5244,7 @@
       </p:sp>
       <p:pic>
         <p:nvPicPr>
-          <p:cNvPr id="84" name="Shape 53"/>
+          <p:cNvPr id="80" name="Shape 41"/>
           <p:cNvPicPr/>
           <p:nvPr/>
         </p:nvPicPr>
@@ -5133,8 +5262,8 @@
         </p:blipFill>
         <p:spPr>
           <a:xfrm>
-            <a:off x="0" y="2000772"/>
-            <a:ext cx="9143640" cy="2208455"/>
+            <a:off x="1148914" y="1882781"/>
+            <a:ext cx="6799934" cy="2378380"/>
           </a:xfrm>
           <a:prstGeom prst="rect">
             <a:avLst/>
@@ -5145,6 +5274,11 @@
         </p:spPr>
       </p:pic>
     </p:spTree>
+    <p:extLst>
+      <p:ext uri="{BB962C8B-B14F-4D97-AF65-F5344CB8AC3E}">
+        <p14:creationId xmlns:p14="http://schemas.microsoft.com/office/powerpoint/2010/main" val="718875893"/>
+      </p:ext>
+    </p:extLst>
   </p:cSld>
   <p:clrMapOvr>
     <a:masterClrMapping/>
@@ -5198,7 +5332,7 @@
       </p:grpSpPr>
       <p:sp>
         <p:nvSpPr>
-          <p:cNvPr id="85" name="TextShape 1"/>
+          <p:cNvPr id="79" name="TextShape 1"/>
           <p:cNvSpPr txBox="1"/>
           <p:nvPr/>
         </p:nvSpPr>
@@ -5225,7 +5359,7 @@
               </a:lnSpc>
             </a:pPr>
             <a:r>
-              <a:rPr lang="pt-BR" sz="2400" b="1" strike="noStrike" spc="-1">
+              <a:rPr lang="pt-BR" sz="3600" b="1" strike="noStrike" spc="-1" dirty="0">
                 <a:solidFill>
                   <a:srgbClr val="FFFFFF"/>
                 </a:solidFill>
@@ -5237,163 +5371,68 @@
                 <a:latin typeface="Arial"/>
                 <a:ea typeface="Arial"/>
               </a:rPr>
-              <a:t>Atividade #1: Reuniões Diárias</a:t>
+              <a:t>
+Artefato </a:t>
             </a:r>
-            <a:endParaRPr lang="pt-BR" sz="1400" b="0" strike="noStrike" spc="-1">
-              <a:solidFill>
-                <a:srgbClr val="000000"/>
-              </a:solidFill>
-              <a:uFill>
-                <a:solidFill>
-                  <a:srgbClr val="FFFFFF"/>
-                </a:solidFill>
-              </a:uFill>
-              <a:latin typeface="Arial"/>
-            </a:endParaRPr>
-          </a:p>
-        </p:txBody>
-      </p:sp>
-      <p:sp>
-        <p:nvSpPr>
-          <p:cNvPr id="86" name="TextShape 2"/>
-          <p:cNvSpPr txBox="1"/>
-          <p:nvPr/>
-        </p:nvSpPr>
-        <p:spPr>
-          <a:xfrm>
-            <a:off x="457200" y="1200240"/>
-            <a:ext cx="8229240" cy="3725280"/>
-          </a:xfrm>
-          <a:prstGeom prst="rect">
-            <a:avLst/>
-          </a:prstGeom>
-          <a:noFill/>
-          <a:ln>
-            <a:noFill/>
-          </a:ln>
-        </p:spPr>
-        <p:txBody>
-          <a:bodyPr tIns="91440" bIns="91440"/>
-          <a:lstStyle/>
-          <a:p>
-            <a:pPr>
-              <a:lnSpc>
-                <a:spcPct val="100000"/>
-              </a:lnSpc>
-            </a:pPr>
-            <a:endParaRPr lang="pt-BR" sz="1400" b="0" strike="noStrike" spc="-1" dirty="0">
-              <a:solidFill>
-                <a:srgbClr val="000000"/>
-              </a:solidFill>
-              <a:uFill>
-                <a:solidFill>
-                  <a:srgbClr val="FFFFFF"/>
-                </a:solidFill>
-              </a:uFill>
-              <a:latin typeface="Arial"/>
-            </a:endParaRPr>
-          </a:p>
-          <a:p>
-            <a:pPr marL="457200" indent="-342720">
-              <a:lnSpc>
-                <a:spcPct val="136000"/>
-              </a:lnSpc>
-              <a:buClr>
-                <a:srgbClr val="000000"/>
-              </a:buClr>
-              <a:buFont typeface="Arial"/>
-              <a:buChar char="●"/>
-            </a:pPr>
             <a:r>
-              <a:rPr lang="pt-BR" sz="1800" b="0" strike="noStrike" spc="-1" dirty="0">
-                <a:solidFill>
-                  <a:srgbClr val="000000"/>
+              <a:rPr lang="pt-BR" sz="3600" b="1" strike="noStrike" spc="-1" dirty="0" smtClean="0">
+                <a:solidFill>
+                  <a:srgbClr val="FFFFFF"/>
                 </a:solidFill>
                 <a:uFill>
                   <a:solidFill>
                     <a:srgbClr val="FFFFFF"/>
                   </a:solidFill>
                 </a:uFill>
-                <a:latin typeface="Times New Roman"/>
-                <a:ea typeface="Times New Roman"/>
+                <a:latin typeface="Arial"/>
+                <a:ea typeface="Arial"/>
               </a:rPr>
-              <a:t>O que foi feito desde a nossa última reunião diária.</a:t>
+              <a:t>#1: </a:t>
             </a:r>
-            <a:endParaRPr lang="pt-BR" sz="1400" b="0" strike="noStrike" spc="-1" dirty="0">
-              <a:solidFill>
-                <a:srgbClr val="000000"/>
-              </a:solidFill>
-              <a:uFill>
-                <a:solidFill>
-                  <a:srgbClr val="FFFFFF"/>
-                </a:solidFill>
-              </a:uFill>
-              <a:latin typeface="Arial"/>
-            </a:endParaRPr>
-          </a:p>
-          <a:p>
-            <a:pPr marL="457200" indent="-342720">
-              <a:lnSpc>
-                <a:spcPct val="136000"/>
-              </a:lnSpc>
-              <a:buClr>
-                <a:srgbClr val="000000"/>
-              </a:buClr>
-              <a:buFont typeface="Arial"/>
-              <a:buChar char="●"/>
-            </a:pPr>
             <a:r>
-              <a:rPr lang="pt-BR" sz="1800" b="0" strike="noStrike" spc="-1" dirty="0">
-                <a:solidFill>
-                  <a:srgbClr val="000000"/>
+              <a:rPr lang="pt-BR" sz="3600" b="1" strike="noStrike" spc="-1" dirty="0" err="1">
+                <a:solidFill>
+                  <a:srgbClr val="FFFFFF"/>
                 </a:solidFill>
                 <a:uFill>
                   <a:solidFill>
                     <a:srgbClr val="FFFFFF"/>
                   </a:solidFill>
                 </a:uFill>
-                <a:latin typeface="Times New Roman"/>
-                <a:ea typeface="Times New Roman"/>
+                <a:latin typeface="Arial"/>
+                <a:ea typeface="Arial"/>
               </a:rPr>
-              <a:t>O que eu pretendo realizar entre hoje e nossa próxima Reunião Diária.</a:t>
+              <a:t>Product</a:t>
             </a:r>
-            <a:endParaRPr lang="pt-BR" sz="1400" b="0" strike="noStrike" spc="-1" dirty="0">
-              <a:solidFill>
-                <a:srgbClr val="000000"/>
-              </a:solidFill>
-              <a:uFill>
-                <a:solidFill>
-                  <a:srgbClr val="FFFFFF"/>
-                </a:solidFill>
-              </a:uFill>
-              <a:latin typeface="Arial"/>
-            </a:endParaRPr>
-          </a:p>
-          <a:p>
-            <a:pPr marL="457200" indent="-342720">
-              <a:lnSpc>
-                <a:spcPct val="136000"/>
-              </a:lnSpc>
-              <a:buClr>
-                <a:srgbClr val="000000"/>
-              </a:buClr>
-              <a:buFont typeface="Arial"/>
-              <a:buChar char="●"/>
-            </a:pPr>
             <a:r>
-              <a:rPr lang="pt-BR" sz="1800" b="0" strike="noStrike" spc="-1" dirty="0">
-                <a:solidFill>
-                  <a:srgbClr val="000000"/>
+              <a:rPr lang="pt-BR" sz="3600" b="1" strike="noStrike" spc="-1" dirty="0">
+                <a:solidFill>
+                  <a:srgbClr val="FFFFFF"/>
                 </a:solidFill>
                 <a:uFill>
                   <a:solidFill>
                     <a:srgbClr val="FFFFFF"/>
                   </a:solidFill>
                 </a:uFill>
-                <a:latin typeface="Times New Roman"/>
-                <a:ea typeface="Times New Roman"/>
+                <a:latin typeface="Arial"/>
+                <a:ea typeface="Arial"/>
               </a:rPr>
-              <a:t>O que (se houver) está impedindo o meu progresso.</a:t>
+              <a:t> </a:t>
+            </a:r>
+            <a:r>
+              <a:rPr lang="pt-BR" sz="3600" b="1" strike="noStrike" spc="-1" dirty="0" err="1">
+                <a:solidFill>
+                  <a:srgbClr val="FFFFFF"/>
+                </a:solidFill>
+                <a:uFill>
+                  <a:solidFill>
+                    <a:srgbClr val="FFFFFF"/>
+                  </a:solidFill>
+                </a:uFill>
+                <a:latin typeface="Arial"/>
+                <a:ea typeface="Arial"/>
+              </a:rPr>
+              <a:t>Backlog</a:t>
             </a:r>
             <a:endParaRPr lang="pt-BR" sz="1400" b="0" strike="noStrike" spc="-1" dirty="0">
               <a:solidFill>
@@ -5407,99 +5446,45 @@
               <a:latin typeface="Arial"/>
             </a:endParaRPr>
           </a:p>
-          <a:p>
-            <a:pPr>
-              <a:lnSpc>
-                <a:spcPct val="136000"/>
-              </a:lnSpc>
-            </a:pPr>
-            <a:endParaRPr lang="pt-BR" sz="1400" b="0" strike="noStrike" spc="-1" dirty="0">
-              <a:solidFill>
-                <a:srgbClr val="000000"/>
-              </a:solidFill>
-              <a:uFill>
-                <a:solidFill>
-                  <a:srgbClr val="FFFFFF"/>
-                </a:solidFill>
-              </a:uFill>
-              <a:latin typeface="Arial"/>
-            </a:endParaRPr>
-          </a:p>
-          <a:p>
-            <a:pPr>
-              <a:lnSpc>
-                <a:spcPct val="136000"/>
-              </a:lnSpc>
-            </a:pPr>
-            <a:endParaRPr lang="pt-BR" sz="1400" b="0" strike="noStrike" spc="-1" dirty="0">
-              <a:solidFill>
-                <a:srgbClr val="000000"/>
-              </a:solidFill>
-              <a:uFill>
-                <a:solidFill>
-                  <a:srgbClr val="FFFFFF"/>
-                </a:solidFill>
-              </a:uFill>
-              <a:latin typeface="Arial"/>
-            </a:endParaRPr>
-          </a:p>
-          <a:p>
-            <a:pPr>
-              <a:lnSpc>
-                <a:spcPct val="136000"/>
-              </a:lnSpc>
-            </a:pPr>
-            <a:endParaRPr lang="pt-BR" sz="1400" b="0" strike="noStrike" spc="-1" dirty="0">
-              <a:solidFill>
-                <a:srgbClr val="000000"/>
-              </a:solidFill>
-              <a:uFill>
-                <a:solidFill>
-                  <a:srgbClr val="FFFFFF"/>
-                </a:solidFill>
-              </a:uFill>
-              <a:latin typeface="Arial"/>
-            </a:endParaRPr>
-          </a:p>
-          <a:p>
-            <a:pPr>
-              <a:lnSpc>
-                <a:spcPct val="136000"/>
-              </a:lnSpc>
-            </a:pPr>
-            <a:endParaRPr lang="pt-BR" sz="1400" b="0" strike="noStrike" spc="-1" dirty="0">
-              <a:solidFill>
-                <a:srgbClr val="000000"/>
-              </a:solidFill>
-              <a:uFill>
-                <a:solidFill>
-                  <a:srgbClr val="FFFFFF"/>
-                </a:solidFill>
-              </a:uFill>
-              <a:latin typeface="Arial"/>
-            </a:endParaRPr>
-          </a:p>
-          <a:p>
-            <a:pPr>
-              <a:lnSpc>
-                <a:spcPct val="100000"/>
-              </a:lnSpc>
-            </a:pPr>
-            <a:endParaRPr lang="pt-BR" sz="1400" b="0" strike="noStrike" spc="-1" dirty="0">
-              <a:solidFill>
-                <a:srgbClr val="000000"/>
-              </a:solidFill>
-              <a:uFill>
-                <a:solidFill>
-                  <a:srgbClr val="FFFFFF"/>
-                </a:solidFill>
-              </a:uFill>
-              <a:latin typeface="Arial"/>
-            </a:endParaRPr>
-          </a:p>
-        </p:txBody>
-      </p:sp>
+        </p:txBody>
+      </p:sp>
+      <p:pic>
+        <p:nvPicPr>
+          <p:cNvPr id="80" name="Shape 41"/>
+          <p:cNvPicPr/>
+          <p:nvPr/>
+        </p:nvPicPr>
+        <p:blipFill>
+          <a:blip r:embed="rId2">
+            <a:extLst>
+              <a:ext uri="{28A0092B-C50C-407E-A947-70E740481C1C}">
+                <a14:useLocalDpi xmlns:a14="http://schemas.microsoft.com/office/drawing/2010/main" val="0"/>
+              </a:ext>
+            </a:extLst>
+          </a:blip>
+          <a:stretch>
+            <a:fillRect/>
+          </a:stretch>
+        </p:blipFill>
+        <p:spPr>
+          <a:xfrm>
+            <a:off x="1288772" y="1882781"/>
+            <a:ext cx="6520217" cy="2378380"/>
+          </a:xfrm>
+          <a:prstGeom prst="rect">
+            <a:avLst/>
+          </a:prstGeom>
+          <a:ln>
+            <a:noFill/>
+          </a:ln>
+        </p:spPr>
+      </p:pic>
     </p:spTree>
+    <p:extLst>
+      <p:ext uri="{BB962C8B-B14F-4D97-AF65-F5344CB8AC3E}">
+        <p14:creationId xmlns:p14="http://schemas.microsoft.com/office/powerpoint/2010/main" val="2134100672"/>
+      </p:ext>
+    </p:extLst>
   </p:cSld>
   <p:clrMapOvr>
     <a:masterClrMapping/>
@@ -5553,6 +5538,611 @@
       </p:grpSpPr>
       <p:sp>
         <p:nvSpPr>
+          <p:cNvPr id="81" name="TextShape 1"/>
+          <p:cNvSpPr txBox="1"/>
+          <p:nvPr/>
+        </p:nvSpPr>
+        <p:spPr>
+          <a:xfrm>
+            <a:off x="457200" y="205920"/>
+            <a:ext cx="8229240" cy="857160"/>
+          </a:xfrm>
+          <a:prstGeom prst="rect">
+            <a:avLst/>
+          </a:prstGeom>
+          <a:noFill/>
+          <a:ln>
+            <a:noFill/>
+          </a:ln>
+        </p:spPr>
+        <p:txBody>
+          <a:bodyPr tIns="91440" bIns="91440" anchor="b"/>
+          <a:lstStyle/>
+          <a:p>
+            <a:pPr>
+              <a:lnSpc>
+                <a:spcPct val="100000"/>
+              </a:lnSpc>
+            </a:pPr>
+            <a:r>
+              <a:rPr lang="pt-BR" sz="3600" b="1" strike="noStrike" spc="-1">
+                <a:solidFill>
+                  <a:srgbClr val="FFFFFF"/>
+                </a:solidFill>
+                <a:uFill>
+                  <a:solidFill>
+                    <a:srgbClr val="FFFFFF"/>
+                  </a:solidFill>
+                </a:uFill>
+                <a:latin typeface="Arial"/>
+                <a:ea typeface="Arial"/>
+              </a:rPr>
+              <a:t>
+Artefato #2: Sprint Backlog</a:t>
+            </a:r>
+            <a:endParaRPr lang="pt-BR" sz="1400" b="0" strike="noStrike" spc="-1">
+              <a:solidFill>
+                <a:srgbClr val="000000"/>
+              </a:solidFill>
+              <a:uFill>
+                <a:solidFill>
+                  <a:srgbClr val="FFFFFF"/>
+                </a:solidFill>
+              </a:uFill>
+              <a:latin typeface="Arial"/>
+            </a:endParaRPr>
+          </a:p>
+        </p:txBody>
+      </p:sp>
+      <p:pic>
+        <p:nvPicPr>
+          <p:cNvPr id="82" name="Shape 47"/>
+          <p:cNvPicPr/>
+          <p:nvPr/>
+        </p:nvPicPr>
+        <p:blipFill>
+          <a:blip r:embed="rId2">
+            <a:extLst>
+              <a:ext uri="{28A0092B-C50C-407E-A947-70E740481C1C}">
+                <a14:useLocalDpi xmlns:a14="http://schemas.microsoft.com/office/drawing/2010/main" val="0"/>
+              </a:ext>
+            </a:extLst>
+          </a:blip>
+          <a:stretch>
+            <a:fillRect/>
+          </a:stretch>
+        </p:blipFill>
+        <p:spPr>
+          <a:xfrm>
+            <a:off x="1074858" y="1404000"/>
+            <a:ext cx="6958284" cy="3456000"/>
+          </a:xfrm>
+          <a:prstGeom prst="rect">
+            <a:avLst/>
+          </a:prstGeom>
+          <a:ln>
+            <a:noFill/>
+          </a:ln>
+        </p:spPr>
+      </p:pic>
+    </p:spTree>
+  </p:cSld>
+  <p:clrMapOvr>
+    <a:masterClrMapping/>
+  </p:clrMapOvr>
+  <p:timing>
+    <p:tnLst>
+      <p:par>
+        <p:cTn id="1" dur="indefinite" restart="never" nodeType="tmRoot">
+          <p:childTnLst>
+            <p:seq>
+              <p:cTn id="2" nodeType="mainSeq"/>
+              <p:prevCondLst>
+                <p:cond evt="onPrev" delay="0">
+                  <p:tgtEl>
+                    <p:sldTgt/>
+                  </p:tgtEl>
+                </p:cond>
+              </p:prevCondLst>
+              <p:nextCondLst>
+                <p:cond evt="onNext" delay="0">
+                  <p:tgtEl>
+                    <p:sldTgt/>
+                  </p:tgtEl>
+                </p:cond>
+              </p:nextCondLst>
+            </p:seq>
+          </p:childTnLst>
+        </p:cTn>
+      </p:par>
+    </p:tnLst>
+  </p:timing>
+</p:sld>
+</file>
+
+<file path=ppt/slides/slide7.xml><?xml version="1.0" encoding="utf-8"?>
+<p:sld xmlns:a="http://schemas.openxmlformats.org/drawingml/2006/main" xmlns:r="http://schemas.openxmlformats.org/officeDocument/2006/relationships" xmlns:p="http://schemas.openxmlformats.org/presentationml/2006/main">
+  <p:cSld>
+    <p:spTree>
+      <p:nvGrpSpPr>
+        <p:cNvPr id="1" name=""/>
+        <p:cNvGrpSpPr/>
+        <p:nvPr/>
+      </p:nvGrpSpPr>
+      <p:grpSpPr>
+        <a:xfrm>
+          <a:off x="0" y="0"/>
+          <a:ext cx="0" cy="0"/>
+          <a:chOff x="0" y="0"/>
+          <a:chExt cx="0" cy="0"/>
+        </a:xfrm>
+      </p:grpSpPr>
+      <p:sp>
+        <p:nvSpPr>
+          <p:cNvPr id="83" name="TextShape 1"/>
+          <p:cNvSpPr txBox="1"/>
+          <p:nvPr/>
+        </p:nvSpPr>
+        <p:spPr>
+          <a:xfrm>
+            <a:off x="457200" y="205920"/>
+            <a:ext cx="8229240" cy="857160"/>
+          </a:xfrm>
+          <a:prstGeom prst="rect">
+            <a:avLst/>
+          </a:prstGeom>
+          <a:noFill/>
+          <a:ln>
+            <a:noFill/>
+          </a:ln>
+        </p:spPr>
+        <p:txBody>
+          <a:bodyPr tIns="91440" bIns="91440" anchor="b"/>
+          <a:lstStyle/>
+          <a:p>
+            <a:pPr>
+              <a:lnSpc>
+                <a:spcPct val="100000"/>
+              </a:lnSpc>
+            </a:pPr>
+            <a:r>
+              <a:rPr lang="pt-BR" sz="3600" b="1" strike="noStrike" spc="-1">
+                <a:solidFill>
+                  <a:srgbClr val="FFFFFF"/>
+                </a:solidFill>
+                <a:uFill>
+                  <a:solidFill>
+                    <a:srgbClr val="FFFFFF"/>
+                  </a:solidFill>
+                </a:uFill>
+                <a:latin typeface="Arial"/>
+                <a:ea typeface="Arial"/>
+              </a:rPr>
+              <a:t>Artefato #3: Gráfico Burndown</a:t>
+            </a:r>
+            <a:endParaRPr lang="pt-BR" sz="1400" b="0" strike="noStrike" spc="-1">
+              <a:solidFill>
+                <a:srgbClr val="000000"/>
+              </a:solidFill>
+              <a:uFill>
+                <a:solidFill>
+                  <a:srgbClr val="FFFFFF"/>
+                </a:solidFill>
+              </a:uFill>
+              <a:latin typeface="Arial"/>
+            </a:endParaRPr>
+          </a:p>
+        </p:txBody>
+      </p:sp>
+    </p:spTree>
+  </p:cSld>
+  <p:clrMapOvr>
+    <a:masterClrMapping/>
+  </p:clrMapOvr>
+  <p:timing>
+    <p:tnLst>
+      <p:par>
+        <p:cTn id="1" dur="indefinite" restart="never" nodeType="tmRoot">
+          <p:childTnLst>
+            <p:seq>
+              <p:cTn id="2" nodeType="mainSeq"/>
+              <p:prevCondLst>
+                <p:cond evt="onPrev" delay="0">
+                  <p:tgtEl>
+                    <p:sldTgt/>
+                  </p:tgtEl>
+                </p:cond>
+              </p:prevCondLst>
+              <p:nextCondLst>
+                <p:cond evt="onNext" delay="0">
+                  <p:tgtEl>
+                    <p:sldTgt/>
+                  </p:tgtEl>
+                </p:cond>
+              </p:nextCondLst>
+            </p:seq>
+          </p:childTnLst>
+        </p:cTn>
+      </p:par>
+    </p:tnLst>
+  </p:timing>
+</p:sld>
+</file>
+
+<file path=ppt/slides/slide8.xml><?xml version="1.0" encoding="utf-8"?>
+<p:sld xmlns:a="http://schemas.openxmlformats.org/drawingml/2006/main" xmlns:r="http://schemas.openxmlformats.org/officeDocument/2006/relationships" xmlns:p="http://schemas.openxmlformats.org/presentationml/2006/main">
+  <p:cSld>
+    <p:spTree>
+      <p:nvGrpSpPr>
+        <p:cNvPr id="1" name=""/>
+        <p:cNvGrpSpPr/>
+        <p:nvPr/>
+      </p:nvGrpSpPr>
+      <p:grpSpPr>
+        <a:xfrm>
+          <a:off x="0" y="0"/>
+          <a:ext cx="0" cy="0"/>
+          <a:chOff x="0" y="0"/>
+          <a:chExt cx="0" cy="0"/>
+        </a:xfrm>
+      </p:grpSpPr>
+      <p:sp>
+        <p:nvSpPr>
+          <p:cNvPr id="85" name="TextShape 1"/>
+          <p:cNvSpPr txBox="1"/>
+          <p:nvPr/>
+        </p:nvSpPr>
+        <p:spPr>
+          <a:xfrm>
+            <a:off x="457200" y="205920"/>
+            <a:ext cx="8229240" cy="857160"/>
+          </a:xfrm>
+          <a:prstGeom prst="rect">
+            <a:avLst/>
+          </a:prstGeom>
+          <a:noFill/>
+          <a:ln>
+            <a:noFill/>
+          </a:ln>
+        </p:spPr>
+        <p:txBody>
+          <a:bodyPr tIns="91440" bIns="91440" anchor="b"/>
+          <a:lstStyle/>
+          <a:p>
+            <a:pPr>
+              <a:lnSpc>
+                <a:spcPct val="100000"/>
+              </a:lnSpc>
+            </a:pPr>
+            <a:r>
+              <a:rPr lang="pt-BR" sz="2400" b="1" strike="noStrike" spc="-1">
+                <a:solidFill>
+                  <a:srgbClr val="FFFFFF"/>
+                </a:solidFill>
+                <a:uFill>
+                  <a:solidFill>
+                    <a:srgbClr val="FFFFFF"/>
+                  </a:solidFill>
+                </a:uFill>
+                <a:latin typeface="Arial"/>
+                <a:ea typeface="Arial"/>
+              </a:rPr>
+              <a:t>Atividade #1: Reuniões Diárias</a:t>
+            </a:r>
+            <a:endParaRPr lang="pt-BR" sz="1400" b="0" strike="noStrike" spc="-1">
+              <a:solidFill>
+                <a:srgbClr val="000000"/>
+              </a:solidFill>
+              <a:uFill>
+                <a:solidFill>
+                  <a:srgbClr val="FFFFFF"/>
+                </a:solidFill>
+              </a:uFill>
+              <a:latin typeface="Arial"/>
+            </a:endParaRPr>
+          </a:p>
+        </p:txBody>
+      </p:sp>
+      <p:sp>
+        <p:nvSpPr>
+          <p:cNvPr id="86" name="TextShape 2"/>
+          <p:cNvSpPr txBox="1"/>
+          <p:nvPr/>
+        </p:nvSpPr>
+        <p:spPr>
+          <a:xfrm>
+            <a:off x="457200" y="1200240"/>
+            <a:ext cx="8229240" cy="3725280"/>
+          </a:xfrm>
+          <a:prstGeom prst="rect">
+            <a:avLst/>
+          </a:prstGeom>
+          <a:noFill/>
+          <a:ln>
+            <a:noFill/>
+          </a:ln>
+        </p:spPr>
+        <p:txBody>
+          <a:bodyPr tIns="91440" bIns="91440"/>
+          <a:lstStyle/>
+          <a:p>
+            <a:pPr>
+              <a:lnSpc>
+                <a:spcPct val="100000"/>
+              </a:lnSpc>
+            </a:pPr>
+            <a:endParaRPr lang="pt-BR" sz="1400" b="0" strike="noStrike" spc="-1" dirty="0">
+              <a:solidFill>
+                <a:srgbClr val="000000"/>
+              </a:solidFill>
+              <a:uFill>
+                <a:solidFill>
+                  <a:srgbClr val="FFFFFF"/>
+                </a:solidFill>
+              </a:uFill>
+              <a:latin typeface="Arial"/>
+            </a:endParaRPr>
+          </a:p>
+          <a:p>
+            <a:pPr marL="457200" indent="-342720">
+              <a:lnSpc>
+                <a:spcPct val="136000"/>
+              </a:lnSpc>
+              <a:buClr>
+                <a:srgbClr val="000000"/>
+              </a:buClr>
+              <a:buFont typeface="Arial"/>
+              <a:buChar char="●"/>
+            </a:pPr>
+            <a:r>
+              <a:rPr lang="pt-BR" sz="1800" b="0" strike="noStrike" spc="-1" dirty="0">
+                <a:solidFill>
+                  <a:srgbClr val="000000"/>
+                </a:solidFill>
+                <a:uFill>
+                  <a:solidFill>
+                    <a:srgbClr val="FFFFFF"/>
+                  </a:solidFill>
+                </a:uFill>
+                <a:latin typeface="Times New Roman"/>
+                <a:ea typeface="Times New Roman"/>
+              </a:rPr>
+              <a:t>O que foi feito desde a nossa última reunião diária.</a:t>
+            </a:r>
+            <a:endParaRPr lang="pt-BR" sz="1400" b="0" strike="noStrike" spc="-1" dirty="0">
+              <a:solidFill>
+                <a:srgbClr val="000000"/>
+              </a:solidFill>
+              <a:uFill>
+                <a:solidFill>
+                  <a:srgbClr val="FFFFFF"/>
+                </a:solidFill>
+              </a:uFill>
+              <a:latin typeface="Arial"/>
+            </a:endParaRPr>
+          </a:p>
+          <a:p>
+            <a:pPr marL="457200" indent="-342720">
+              <a:lnSpc>
+                <a:spcPct val="136000"/>
+              </a:lnSpc>
+              <a:buClr>
+                <a:srgbClr val="000000"/>
+              </a:buClr>
+              <a:buFont typeface="Arial"/>
+              <a:buChar char="●"/>
+            </a:pPr>
+            <a:r>
+              <a:rPr lang="pt-BR" sz="1800" b="0" strike="noStrike" spc="-1" dirty="0">
+                <a:solidFill>
+                  <a:srgbClr val="000000"/>
+                </a:solidFill>
+                <a:uFill>
+                  <a:solidFill>
+                    <a:srgbClr val="FFFFFF"/>
+                  </a:solidFill>
+                </a:uFill>
+                <a:latin typeface="Times New Roman"/>
+                <a:ea typeface="Times New Roman"/>
+              </a:rPr>
+              <a:t>O que eu pretendo realizar entre hoje e nossa próxima Reunião Diária.</a:t>
+            </a:r>
+            <a:endParaRPr lang="pt-BR" sz="1400" b="0" strike="noStrike" spc="-1" dirty="0">
+              <a:solidFill>
+                <a:srgbClr val="000000"/>
+              </a:solidFill>
+              <a:uFill>
+                <a:solidFill>
+                  <a:srgbClr val="FFFFFF"/>
+                </a:solidFill>
+              </a:uFill>
+              <a:latin typeface="Arial"/>
+            </a:endParaRPr>
+          </a:p>
+          <a:p>
+            <a:pPr marL="457200" indent="-342720">
+              <a:lnSpc>
+                <a:spcPct val="136000"/>
+              </a:lnSpc>
+              <a:buClr>
+                <a:srgbClr val="000000"/>
+              </a:buClr>
+              <a:buFont typeface="Arial"/>
+              <a:buChar char="●"/>
+            </a:pPr>
+            <a:r>
+              <a:rPr lang="pt-BR" sz="1800" b="0" strike="noStrike" spc="-1" dirty="0">
+                <a:solidFill>
+                  <a:srgbClr val="000000"/>
+                </a:solidFill>
+                <a:uFill>
+                  <a:solidFill>
+                    <a:srgbClr val="FFFFFF"/>
+                  </a:solidFill>
+                </a:uFill>
+                <a:latin typeface="Times New Roman"/>
+                <a:ea typeface="Times New Roman"/>
+              </a:rPr>
+              <a:t>O que (se houver) está impedindo o meu progresso.</a:t>
+            </a:r>
+            <a:endParaRPr lang="pt-BR" sz="1400" b="0" strike="noStrike" spc="-1" dirty="0">
+              <a:solidFill>
+                <a:srgbClr val="000000"/>
+              </a:solidFill>
+              <a:uFill>
+                <a:solidFill>
+                  <a:srgbClr val="FFFFFF"/>
+                </a:solidFill>
+              </a:uFill>
+              <a:latin typeface="Arial"/>
+            </a:endParaRPr>
+          </a:p>
+          <a:p>
+            <a:pPr>
+              <a:lnSpc>
+                <a:spcPct val="136000"/>
+              </a:lnSpc>
+            </a:pPr>
+            <a:endParaRPr lang="pt-BR" sz="1400" b="0" strike="noStrike" spc="-1" dirty="0">
+              <a:solidFill>
+                <a:srgbClr val="000000"/>
+              </a:solidFill>
+              <a:uFill>
+                <a:solidFill>
+                  <a:srgbClr val="FFFFFF"/>
+                </a:solidFill>
+              </a:uFill>
+              <a:latin typeface="Arial"/>
+            </a:endParaRPr>
+          </a:p>
+          <a:p>
+            <a:pPr>
+              <a:lnSpc>
+                <a:spcPct val="136000"/>
+              </a:lnSpc>
+            </a:pPr>
+            <a:endParaRPr lang="pt-BR" sz="1400" b="0" strike="noStrike" spc="-1" dirty="0">
+              <a:solidFill>
+                <a:srgbClr val="000000"/>
+              </a:solidFill>
+              <a:uFill>
+                <a:solidFill>
+                  <a:srgbClr val="FFFFFF"/>
+                </a:solidFill>
+              </a:uFill>
+              <a:latin typeface="Arial"/>
+            </a:endParaRPr>
+          </a:p>
+          <a:p>
+            <a:pPr>
+              <a:lnSpc>
+                <a:spcPct val="136000"/>
+              </a:lnSpc>
+            </a:pPr>
+            <a:endParaRPr lang="pt-BR" sz="1400" b="0" strike="noStrike" spc="-1" dirty="0">
+              <a:solidFill>
+                <a:srgbClr val="000000"/>
+              </a:solidFill>
+              <a:uFill>
+                <a:solidFill>
+                  <a:srgbClr val="FFFFFF"/>
+                </a:solidFill>
+              </a:uFill>
+              <a:latin typeface="Arial"/>
+            </a:endParaRPr>
+          </a:p>
+          <a:p>
+            <a:pPr>
+              <a:lnSpc>
+                <a:spcPct val="136000"/>
+              </a:lnSpc>
+            </a:pPr>
+            <a:endParaRPr lang="pt-BR" sz="1400" b="0" strike="noStrike" spc="-1" dirty="0">
+              <a:solidFill>
+                <a:srgbClr val="000000"/>
+              </a:solidFill>
+              <a:uFill>
+                <a:solidFill>
+                  <a:srgbClr val="FFFFFF"/>
+                </a:solidFill>
+              </a:uFill>
+              <a:latin typeface="Arial"/>
+            </a:endParaRPr>
+          </a:p>
+          <a:p>
+            <a:pPr>
+              <a:lnSpc>
+                <a:spcPct val="100000"/>
+              </a:lnSpc>
+            </a:pPr>
+            <a:endParaRPr lang="pt-BR" sz="1400" b="0" strike="noStrike" spc="-1" dirty="0">
+              <a:solidFill>
+                <a:srgbClr val="000000"/>
+              </a:solidFill>
+              <a:uFill>
+                <a:solidFill>
+                  <a:srgbClr val="FFFFFF"/>
+                </a:solidFill>
+              </a:uFill>
+              <a:latin typeface="Arial"/>
+            </a:endParaRPr>
+          </a:p>
+        </p:txBody>
+      </p:sp>
+    </p:spTree>
+  </p:cSld>
+  <p:clrMapOvr>
+    <a:masterClrMapping/>
+  </p:clrMapOvr>
+  <p:timing>
+    <p:tnLst>
+      <p:par>
+        <p:cTn id="1" dur="indefinite" restart="never" nodeType="tmRoot">
+          <p:childTnLst>
+            <p:seq>
+              <p:cTn id="2" nodeType="mainSeq"/>
+              <p:prevCondLst>
+                <p:cond evt="onPrev" delay="0">
+                  <p:tgtEl>
+                    <p:sldTgt/>
+                  </p:tgtEl>
+                </p:cond>
+              </p:prevCondLst>
+              <p:nextCondLst>
+                <p:cond evt="onNext" delay="0">
+                  <p:tgtEl>
+                    <p:sldTgt/>
+                  </p:tgtEl>
+                </p:cond>
+              </p:nextCondLst>
+            </p:seq>
+          </p:childTnLst>
+        </p:cTn>
+      </p:par>
+    </p:tnLst>
+  </p:timing>
+</p:sld>
+</file>
+
+<file path=ppt/slides/slide9.xml><?xml version="1.0" encoding="utf-8"?>
+<p:sld xmlns:a="http://schemas.openxmlformats.org/drawingml/2006/main" xmlns:r="http://schemas.openxmlformats.org/officeDocument/2006/relationships" xmlns:p="http://schemas.openxmlformats.org/presentationml/2006/main">
+  <p:cSld>
+    <p:spTree>
+      <p:nvGrpSpPr>
+        <p:cNvPr id="1" name=""/>
+        <p:cNvGrpSpPr/>
+        <p:nvPr/>
+      </p:nvGrpSpPr>
+      <p:grpSpPr>
+        <a:xfrm>
+          <a:off x="0" y="0"/>
+          <a:ext cx="0" cy="0"/>
+          <a:chOff x="0" y="0"/>
+          <a:chExt cx="0" cy="0"/>
+        </a:xfrm>
+      </p:grpSpPr>
+      <p:sp>
+        <p:nvSpPr>
           <p:cNvPr id="87" name="TextShape 1"/>
           <p:cNvSpPr txBox="1"/>
           <p:nvPr/>
@@ -5632,8 +6222,8 @@
           <a:lstStyle/>
           <a:p>
             <a:pPr marL="285750" lvl="0" indent="-285750" fontAlgn="base">
-              <a:buFont typeface="Wingdings" panose="05000000000000000000" pitchFamily="2" charset="2"/>
-              <a:buChar char="§"/>
+              <a:buFont typeface="Arial" panose="020B0604020202020204" pitchFamily="34" charset="0"/>
+              <a:buChar char="•"/>
             </a:pPr>
             <a:r>
               <a:rPr lang="pt-BR" sz="1400" b="1" dirty="0"/>
@@ -5642,26 +6232,21 @@
             <a:endParaRPr lang="pt-BR" sz="1400" dirty="0"/>
           </a:p>
           <a:p>
-            <a:pPr algn="just"/>
             <a:r>
               <a:rPr lang="pt-BR" sz="1400" dirty="0" smtClean="0"/>
               <a:t>	A </a:t>
             </a:r>
             <a:r>
               <a:rPr lang="pt-BR" sz="1400" dirty="0"/>
-              <a:t>equipe teve uma boa comunicação, sendo assim foi definido a divisão nessa Sprint por </a:t>
+              <a:t>equipe conseguiu seguir a carga horária diária de acordo com as horas propostas pela </a:t>
             </a:r>
             <a:r>
               <a:rPr lang="pt-BR" sz="1400" dirty="0" smtClean="0"/>
-              <a:t>	história</a:t>
+              <a:t>	Sprint </a:t>
             </a:r>
             <a:r>
-              <a:rPr lang="pt-BR" sz="1400" dirty="0"/>
-              <a:t>, por essa razão cada membro da equipe desenvolveu mais responsabilidade pelas </a:t>
-            </a:r>
-            <a:r>
-              <a:rPr lang="pt-BR" sz="1400" dirty="0" smtClean="0"/>
-              <a:t>	tarefas</a:t>
+              <a:rPr lang="pt-BR" sz="1400" dirty="0" err="1"/>
+              <a:t>BurnDown</a:t>
             </a:r>
             <a:r>
               <a:rPr lang="pt-BR" sz="1400" dirty="0"/>
@@ -5670,8 +6255,8 @@
           </a:p>
           <a:p>
             <a:pPr marL="285750" lvl="0" indent="-285750" fontAlgn="base">
-              <a:buFont typeface="Wingdings" panose="05000000000000000000" pitchFamily="2" charset="2"/>
-              <a:buChar char="§"/>
+              <a:buFont typeface="Arial" panose="020B0604020202020204" pitchFamily="34" charset="0"/>
+              <a:buChar char="•"/>
             </a:pPr>
             <a:r>
               <a:rPr lang="pt-BR" sz="1400" b="1" dirty="0"/>
@@ -5680,28 +6265,27 @@
             <a:endParaRPr lang="pt-BR" sz="1400" dirty="0"/>
           </a:p>
           <a:p>
-            <a:pPr algn="just"/>
             <a:r>
               <a:rPr lang="pt-BR" sz="1400" dirty="0" smtClean="0"/>
               <a:t>	A </a:t>
             </a:r>
             <a:r>
               <a:rPr lang="pt-BR" sz="1400" dirty="0"/>
-              <a:t>equipe teve um pouco de dificuldade em dividir a carga horária diariamente para </a:t>
+              <a:t>equipe teve dificuldade com o controle de versões do sistema, onde ficou </a:t>
             </a:r>
             <a:r>
               <a:rPr lang="pt-BR" sz="1400" dirty="0" smtClean="0"/>
-              <a:t>	trabalhar </a:t>
+              <a:t>	impossibilitado </a:t>
             </a:r>
             <a:r>
               <a:rPr lang="pt-BR" sz="1400" dirty="0"/>
-              <a:t>com o projeto, devido a inúmeras tarefas que foram definidas na Sprint-3.</a:t>
+              <a:t>o compartilhamento do código entre a equipe.</a:t>
             </a:r>
           </a:p>
           <a:p>
             <a:pPr marL="285750" lvl="0" indent="-285750" fontAlgn="base">
-              <a:buFont typeface="Wingdings" panose="05000000000000000000" pitchFamily="2" charset="2"/>
-              <a:buChar char="§"/>
+              <a:buFont typeface="Arial" panose="020B0604020202020204" pitchFamily="34" charset="0"/>
+              <a:buChar char="•"/>
             </a:pPr>
             <a:r>
               <a:rPr lang="pt-BR" sz="1400" b="1" dirty="0"/>
@@ -5710,22 +6294,25 @@
             <a:endParaRPr lang="pt-BR" sz="1400" dirty="0"/>
           </a:p>
           <a:p>
-            <a:pPr algn="just"/>
+            <a:r>
+              <a:rPr lang="pt-BR" sz="1400" dirty="0"/>
+              <a:t>                    A equipe busca trabalhar com tarefas menores que possibilitem o compartilhamento do </a:t>
+            </a:r>
             <a:r>
               <a:rPr lang="pt-BR" sz="1400" dirty="0" smtClean="0"/>
-              <a:t>	A </a:t>
+              <a:t>	código </a:t>
             </a:r>
             <a:r>
               <a:rPr lang="pt-BR" sz="1400" dirty="0"/>
-              <a:t>equipe busca uma melhor performance com o modelo Scrum, sem dificuldades e um </a:t>
+              <a:t>rapidamente, com isso evitar erros de </a:t>
             </a:r>
             <a:r>
-              <a:rPr lang="pt-BR" sz="1400" dirty="0" smtClean="0"/>
-              <a:t>	desenvolvimento </a:t>
+              <a:rPr lang="pt-BR" sz="1400" dirty="0" err="1"/>
+              <a:t>mesclagem</a:t>
             </a:r>
             <a:r>
               <a:rPr lang="pt-BR" sz="1400" dirty="0"/>
-              <a:t>rápido e eficiente.</a:t>
+              <a:t> no controle de versões.</a:t>
             </a:r>
           </a:p>
           <a:p>

</xml_diff>